<commit_message>
Directory Last Modfied Re-Stamper
</commit_message>
<xml_diff>
--- a/Presentations/2016 - IIS ARR & URL Rewrite.pptx
+++ b/Presentations/2016 - IIS ARR & URL Rewrite.pptx
@@ -243,7 +243,7 @@
             <a:fld id="{DBA8BF65-9119-424B-96D4-C24866668588}" type="datetimeFigureOut">
               <a:rPr lang="en-US" smtClean="0"/>
               <a:pPr/>
-              <a:t>8/4/2016</a:t>
+              <a:t>8/5/2016</a:t>
             </a:fld>
             <a:endParaRPr lang="en-US" dirty="0"/>
           </a:p>
@@ -327,7 +327,7 @@
                 </a:solidFill>
               </a:rPr>
               <a:pPr algn="ctr"/>
-              <a:t>8/4/2016</a:t>
+              <a:t>8/5/2016</a:t>
             </a:fld>
             <a:r>
               <a:rPr lang="en-US" sz="800" dirty="0" smtClean="0">
@@ -462,7 +462,7 @@
             <a:fld id="{79FC39F1-47DE-4C2B-BA24-61D3BC4B2F16}" type="datetimeFigureOut">
               <a:rPr lang="en-US" smtClean="0"/>
               <a:pPr/>
-              <a:t>8/4/2016</a:t>
+              <a:t>8/5/2016</a:t>
             </a:fld>
             <a:endParaRPr lang="en-US" dirty="0"/>
           </a:p>
@@ -641,7 +641,7 @@
                 </a:solidFill>
               </a:rPr>
               <a:pPr algn="ctr"/>
-              <a:t>8/4/2016</a:t>
+              <a:t>8/5/2016</a:t>
             </a:fld>
             <a:r>
               <a:rPr lang="en-US" sz="800" dirty="0" smtClean="0">
@@ -2125,7 +2125,7 @@
                 </a:solidFill>
               </a:rPr>
               <a:pPr algn="ctr"/>
-              <a:t>8/4/2016</a:t>
+              <a:t>8/5/2016</a:t>
             </a:fld>
             <a:r>
               <a:rPr lang="en-US" sz="800" dirty="0" smtClean="0">
@@ -2532,7 +2532,7 @@
                 </a:solidFill>
               </a:rPr>
               <a:pPr algn="ctr"/>
-              <a:t>8/4/2016</a:t>
+              <a:t>8/5/2016</a:t>
             </a:fld>
             <a:r>
               <a:rPr lang="en-US" sz="800" dirty="0" smtClean="0">
@@ -2926,7 +2926,7 @@
                 </a:solidFill>
               </a:rPr>
               <a:pPr algn="ctr"/>
-              <a:t>8/4/2016</a:t>
+              <a:t>8/5/2016</a:t>
             </a:fld>
             <a:r>
               <a:rPr lang="en-US" sz="800" dirty="0" smtClean="0">
@@ -3213,7 +3213,7 @@
                 </a:solidFill>
               </a:rPr>
               <a:pPr algn="ctr"/>
-              <a:t>8/4/2016</a:t>
+              <a:t>8/5/2016</a:t>
             </a:fld>
             <a:r>
               <a:rPr lang="en-US" sz="800" dirty="0" smtClean="0">
@@ -3659,7 +3659,7 @@
                 </a:solidFill>
               </a:rPr>
               <a:pPr algn="ctr"/>
-              <a:t>8/4/2016</a:t>
+              <a:t>8/5/2016</a:t>
             </a:fld>
             <a:r>
               <a:rPr lang="en-US" sz="800" dirty="0" smtClean="0">
@@ -4006,7 +4006,7 @@
                 </a:solidFill>
               </a:rPr>
               <a:pPr algn="ctr"/>
-              <a:t>8/4/2016</a:t>
+              <a:t>8/5/2016</a:t>
             </a:fld>
             <a:r>
               <a:rPr lang="en-US" sz="800" dirty="0" smtClean="0">
@@ -4378,7 +4378,7 @@
                 </a:solidFill>
               </a:rPr>
               <a:pPr algn="ctr"/>
-              <a:t>8/4/2016</a:t>
+              <a:t>8/5/2016</a:t>
             </a:fld>
             <a:r>
               <a:rPr lang="en-US" sz="800" dirty="0" smtClean="0">
@@ -4836,7 +4836,7 @@
                 </a:solidFill>
               </a:rPr>
               <a:pPr algn="ctr"/>
-              <a:t>8/4/2016</a:t>
+              <a:t>8/5/2016</a:t>
             </a:fld>
             <a:r>
               <a:rPr lang="en-US" sz="800" dirty="0" smtClean="0">
@@ -5368,7 +5368,7 @@
                 </a:solidFill>
               </a:rPr>
               <a:pPr algn="ctr"/>
-              <a:t>8/4/2016</a:t>
+              <a:t>8/5/2016</a:t>
             </a:fld>
             <a:r>
               <a:rPr lang="en-US" sz="800" dirty="0" smtClean="0">
@@ -5603,7 +5603,7 @@
                 </a:solidFill>
               </a:rPr>
               <a:pPr algn="ctr"/>
-              <a:t>8/4/2016</a:t>
+              <a:t>8/5/2016</a:t>
             </a:fld>
             <a:r>
               <a:rPr lang="en-US" sz="800" dirty="0" smtClean="0">
@@ -6355,7 +6355,7 @@
                 </a:solidFill>
               </a:rPr>
               <a:pPr algn="ctr"/>
-              <a:t>8/4/2016</a:t>
+              <a:t>8/5/2016</a:t>
             </a:fld>
             <a:r>
               <a:rPr lang="en-US" sz="800" dirty="0" smtClean="0">
@@ -6774,7 +6774,7 @@
                 </a:solidFill>
               </a:rPr>
               <a:pPr algn="ctr"/>
-              <a:t>8/4/2016</a:t>
+              <a:t>8/5/2016</a:t>
             </a:fld>
             <a:r>
               <a:rPr lang="en-US" sz="800" dirty="0" smtClean="0">
@@ -7228,7 +7228,7 @@
                 </a:solidFill>
               </a:rPr>
               <a:pPr algn="ctr"/>
-              <a:t>8/4/2016</a:t>
+              <a:t>8/5/2016</a:t>
             </a:fld>
             <a:r>
               <a:rPr lang="en-US" sz="800" dirty="0" smtClean="0">
@@ -7682,7 +7682,7 @@
                 </a:solidFill>
               </a:rPr>
               <a:pPr algn="ctr"/>
-              <a:t>8/4/2016</a:t>
+              <a:t>8/5/2016</a:t>
             </a:fld>
             <a:r>
               <a:rPr lang="en-US" sz="800" dirty="0" smtClean="0">
@@ -8136,7 +8136,7 @@
                 </a:solidFill>
               </a:rPr>
               <a:pPr algn="ctr"/>
-              <a:t>8/4/2016</a:t>
+              <a:t>8/5/2016</a:t>
             </a:fld>
             <a:r>
               <a:rPr lang="en-US" sz="800" dirty="0" smtClean="0">
@@ -8423,7 +8423,7 @@
                 </a:solidFill>
               </a:rPr>
               <a:pPr algn="ctr"/>
-              <a:t>8/4/2016</a:t>
+              <a:t>8/5/2016</a:t>
             </a:fld>
             <a:r>
               <a:rPr lang="en-US" sz="800" dirty="0" smtClean="0">
@@ -8717,7 +8717,7 @@
                 </a:solidFill>
               </a:rPr>
               <a:pPr algn="ctr"/>
-              <a:t>8/4/2016</a:t>
+              <a:t>8/5/2016</a:t>
             </a:fld>
             <a:r>
               <a:rPr lang="en-US" sz="800" dirty="0" smtClean="0">
@@ -8911,7 +8911,7 @@
                 </a:solidFill>
               </a:rPr>
               <a:pPr algn="ctr"/>
-              <a:t>8/4/2016</a:t>
+              <a:t>8/5/2016</a:t>
             </a:fld>
             <a:r>
               <a:rPr lang="en-US" sz="800" dirty="0" smtClean="0">
@@ -9327,7 +9327,7 @@
                 </a:solidFill>
               </a:rPr>
               <a:pPr algn="ctr"/>
-              <a:t>8/4/2016</a:t>
+              <a:t>8/5/2016</a:t>
             </a:fld>
             <a:r>
               <a:rPr lang="en-US" sz="800" dirty="0" smtClean="0">
@@ -9789,7 +9789,7 @@
                 </a:solidFill>
               </a:rPr>
               <a:pPr algn="ctr"/>
-              <a:t>8/4/2016</a:t>
+              <a:t>8/5/2016</a:t>
             </a:fld>
             <a:r>
               <a:rPr lang="en-US" sz="800" dirty="0" smtClean="0">
@@ -10318,7 +10318,7 @@
                 </a:solidFill>
               </a:rPr>
               <a:pPr algn="ctr"/>
-              <a:t>8/4/2016</a:t>
+              <a:t>8/5/2016</a:t>
             </a:fld>
             <a:r>
               <a:rPr lang="en-US" sz="800" dirty="0" smtClean="0">
@@ -10977,7 +10977,7 @@
                 </a:solidFill>
               </a:rPr>
               <a:pPr algn="ctr"/>
-              <a:t>8/4/2016</a:t>
+              <a:t>8/5/2016</a:t>
             </a:fld>
             <a:r>
               <a:rPr lang="en-US" sz="800" dirty="0" smtClean="0">
@@ -11339,7 +11339,7 @@
                 </a:solidFill>
               </a:rPr>
               <a:pPr algn="ctr"/>
-              <a:t>8/4/2016</a:t>
+              <a:t>8/5/2016</a:t>
             </a:fld>
             <a:r>
               <a:rPr lang="en-US" sz="800" dirty="0" smtClean="0">
@@ -11533,7 +11533,7 @@
                 </a:solidFill>
               </a:rPr>
               <a:pPr algn="ctr"/>
-              <a:t>8/4/2016</a:t>
+              <a:t>8/5/2016</a:t>
             </a:fld>
             <a:r>
               <a:rPr lang="en-US" sz="800" dirty="0" smtClean="0">
@@ -11913,7 +11913,7 @@
                 </a:solidFill>
               </a:rPr>
               <a:pPr algn="ctr"/>
-              <a:t>8/4/2016</a:t>
+              <a:t>8/5/2016</a:t>
             </a:fld>
             <a:r>
               <a:rPr lang="en-US" sz="800" dirty="0" smtClean="0">
@@ -12854,11 +12854,7 @@
             </a:r>
             <a:r>
               <a:rPr lang="en-US" dirty="0" smtClean="0"/>
-              <a:t> </a:t>
-            </a:r>
-            <a:r>
-              <a:rPr lang="en-US" dirty="0" smtClean="0"/>
-              <a:t>- 2016</a:t>
+              <a:t> - 2016</a:t>
             </a:r>
             <a:endParaRPr lang="en-US" dirty="0"/>
           </a:p>
@@ -13357,6 +13353,14 @@
   <p:clrMapOvr>
     <a:masterClrMapping/>
   </p:clrMapOvr>
+  <mc:AlternateContent xmlns:mc="http://schemas.openxmlformats.org/markup-compatibility/2006">
+    <mc:Choice xmlns:p14="http://schemas.microsoft.com/office/powerpoint/2010/main" Requires="p14">
+      <p:transition spd="slow" p14:dur="2000"/>
+    </mc:Choice>
+    <mc:Fallback>
+      <p:transition spd="slow"/>
+    </mc:Fallback>
+  </mc:AlternateContent>
   <p:timing>
     <p:tnLst>
       <p:par>
@@ -13643,11 +13647,7 @@
           <a:p>
             <a:r>
               <a:rPr lang="en-US" dirty="0" smtClean="0"/>
-              <a:t>What </a:t>
-            </a:r>
-            <a:r>
-              <a:rPr lang="en-US" dirty="0" smtClean="0"/>
-              <a:t>is the problem we’re trying to solve?</a:t>
+              <a:t>What is the problem we’re trying to solve?</a:t>
             </a:r>
             <a:endParaRPr lang="en-US" dirty="0"/>
           </a:p>
@@ -13759,7 +13759,6 @@
               <a:rPr lang="en-US" dirty="0" smtClean="0"/>
               <a:t>Web</a:t>
             </a:r>
-            <a:endParaRPr lang="en-US" dirty="0" smtClean="0"/>
           </a:p>
           <a:p>
             <a:pPr algn="ctr"/>
@@ -13767,7 +13766,6 @@
               <a:rPr lang="en-US" dirty="0" smtClean="0"/>
               <a:t>Server</a:t>
             </a:r>
-            <a:endParaRPr lang="en-US" dirty="0" smtClean="0"/>
           </a:p>
         </p:txBody>
       </p:sp>
@@ -14169,7 +14167,6 @@
               <a:rPr lang="en-US" dirty="0" smtClean="0"/>
               <a:t>Web</a:t>
             </a:r>
-            <a:endParaRPr lang="en-US" dirty="0" smtClean="0"/>
           </a:p>
           <a:p>
             <a:pPr algn="ctr"/>
@@ -14177,7 +14174,6 @@
               <a:rPr lang="en-US" dirty="0" smtClean="0"/>
               <a:t>Server</a:t>
             </a:r>
-            <a:endParaRPr lang="en-US" dirty="0" smtClean="0"/>
           </a:p>
         </p:txBody>
       </p:sp>
@@ -14221,7 +14217,6 @@
               <a:rPr lang="en-US" dirty="0" smtClean="0"/>
               <a:t>Web</a:t>
             </a:r>
-            <a:endParaRPr lang="en-US" dirty="0" smtClean="0"/>
           </a:p>
           <a:p>
             <a:pPr algn="ctr"/>
@@ -14229,7 +14224,6 @@
               <a:rPr lang="en-US" dirty="0" smtClean="0"/>
               <a:t>Server</a:t>
             </a:r>
-            <a:endParaRPr lang="en-US" dirty="0" smtClean="0"/>
           </a:p>
         </p:txBody>
       </p:sp>
@@ -15300,11 +15294,7 @@
             </a:br>
             <a:r>
               <a:rPr lang="en-US" dirty="0" smtClean="0"/>
-              <a:t>What does a </a:t>
-            </a:r>
-            <a:r>
-              <a:rPr lang="en-US" dirty="0" smtClean="0"/>
-              <a:t>better design look like?</a:t>
+              <a:t>What does a better design look like?</a:t>
             </a:r>
             <a:endParaRPr lang="en-US" dirty="0"/>
           </a:p>
@@ -15350,7 +15340,6 @@
               <a:rPr lang="en-US" dirty="0" smtClean="0"/>
               <a:t>Web</a:t>
             </a:r>
-            <a:endParaRPr lang="en-US" dirty="0" smtClean="0"/>
           </a:p>
           <a:p>
             <a:pPr algn="ctr"/>
@@ -15358,7 +15347,6 @@
               <a:rPr lang="en-US" dirty="0" smtClean="0"/>
               <a:t>Server</a:t>
             </a:r>
-            <a:endParaRPr lang="en-US" dirty="0" smtClean="0"/>
           </a:p>
         </p:txBody>
       </p:sp>
@@ -15862,7 +15850,6 @@
               <a:rPr lang="en-US" dirty="0" smtClean="0"/>
               <a:t>Web</a:t>
             </a:r>
-            <a:endParaRPr lang="en-US" dirty="0" smtClean="0"/>
           </a:p>
           <a:p>
             <a:pPr algn="ctr"/>
@@ -15870,7 +15857,6 @@
               <a:rPr lang="en-US" dirty="0" smtClean="0"/>
               <a:t>Server</a:t>
             </a:r>
-            <a:endParaRPr lang="en-US" dirty="0" smtClean="0"/>
           </a:p>
         </p:txBody>
       </p:sp>
@@ -15914,7 +15900,6 @@
               <a:rPr lang="en-US" dirty="0" smtClean="0"/>
               <a:t>Web</a:t>
             </a:r>
-            <a:endParaRPr lang="en-US" dirty="0" smtClean="0"/>
           </a:p>
           <a:p>
             <a:pPr algn="ctr"/>
@@ -15922,7 +15907,6 @@
               <a:rPr lang="en-US" dirty="0" smtClean="0"/>
               <a:t>Server</a:t>
             </a:r>
-            <a:endParaRPr lang="en-US" dirty="0" smtClean="0"/>
           </a:p>
         </p:txBody>
       </p:sp>

</xml_diff>